<commit_message>
kleine Korrektur bei Fazit
</commit_message>
<xml_diff>
--- a/Präsentation Gruppe 5.pptx
+++ b/Präsentation Gruppe 5.pptx
@@ -160,7 +160,7 @@
   </p:defaultTextStyle>
   <p:extLst>
     <p:ext uri="{521415D9-36F7-43E2-AB2F-B90AF26B5E84}">
-      <p14:sectionLst xmlns:p14="http://schemas.microsoft.com/office/powerpoint/2010/main">
+      <p14:sectionLst xmlns:p14="http://schemas.microsoft.com/office/powerpoint/2010/main" xmlns="">
         <p14:section name="Fachlabor IT" id="{DED19D9C-E72F-4B67-BED8-A255EA795F3F}">
           <p14:sldIdLst>
             <p14:sldId id="256"/>
@@ -211,7 +211,7 @@
       </p14:sectionLst>
     </p:ext>
     <p:ext uri="{EFAFB233-063F-42B5-8137-9DF3F51BA10A}">
-      <p15:sldGuideLst xmlns:p15="http://schemas.microsoft.com/office/powerpoint/2012/main">
+      <p15:sldGuideLst xmlns:p15="http://schemas.microsoft.com/office/powerpoint/2012/main" xmlns="">
         <p15:guide id="1" orient="horz" pos="935" userDrawn="1">
           <p15:clr>
             <a:srgbClr val="A4A3A4"/>
@@ -225,7 +225,7 @@
       </p15:sldGuideLst>
     </p:ext>
     <p:ext uri="{2D200454-40CA-4A62-9FC3-DE9A4176ACB9}">
-      <p15:notesGuideLst xmlns:p15="http://schemas.microsoft.com/office/powerpoint/2012/main">
+      <p15:notesGuideLst xmlns:p15="http://schemas.microsoft.com/office/powerpoint/2012/main" xmlns="">
         <p15:guide id="1" orient="horz" pos="3132">
           <p15:clr>
             <a:srgbClr val="A4A3A4"/>
@@ -465,7 +465,7 @@
     </p:spTree>
     <p:extLst>
       <p:ext uri="{BB962C8B-B14F-4D97-AF65-F5344CB8AC3E}">
-        <p14:creationId xmlns:p14="http://schemas.microsoft.com/office/powerpoint/2010/main" val="2340697763"/>
+        <p14:creationId xmlns:p14="http://schemas.microsoft.com/office/powerpoint/2010/main" xmlns="" val="2340697763"/>
       </p:ext>
     </p:extLst>
   </p:cSld>
@@ -795,7 +795,7 @@
     </p:spTree>
     <p:extLst>
       <p:ext uri="{BB962C8B-B14F-4D97-AF65-F5344CB8AC3E}">
-        <p14:creationId xmlns:p14="http://schemas.microsoft.com/office/powerpoint/2010/main" val="3722097906"/>
+        <p14:creationId xmlns:p14="http://schemas.microsoft.com/office/powerpoint/2010/main" xmlns="" val="3722097906"/>
       </p:ext>
     </p:extLst>
   </p:cSld>
@@ -1019,7 +1019,7 @@
     </p:spTree>
     <p:extLst>
       <p:ext uri="{BB962C8B-B14F-4D97-AF65-F5344CB8AC3E}">
-        <p14:creationId xmlns:p14="http://schemas.microsoft.com/office/powerpoint/2010/main" val="3197195781"/>
+        <p14:creationId xmlns:p14="http://schemas.microsoft.com/office/powerpoint/2010/main" xmlns="" val="3197195781"/>
       </p:ext>
     </p:extLst>
   </p:cSld>
@@ -1228,7 +1228,7 @@
     </p:spTree>
     <p:extLst>
       <p:ext uri="{BB962C8B-B14F-4D97-AF65-F5344CB8AC3E}">
-        <p14:creationId xmlns:p14="http://schemas.microsoft.com/office/powerpoint/2010/main" val="2132037008"/>
+        <p14:creationId xmlns:p14="http://schemas.microsoft.com/office/powerpoint/2010/main" xmlns="" val="2132037008"/>
       </p:ext>
     </p:extLst>
   </p:cSld>
@@ -1323,7 +1323,7 @@
     </p:spTree>
     <p:extLst>
       <p:ext uri="{BB962C8B-B14F-4D97-AF65-F5344CB8AC3E}">
-        <p14:creationId xmlns:p14="http://schemas.microsoft.com/office/powerpoint/2010/main" val="3022281367"/>
+        <p14:creationId xmlns:p14="http://schemas.microsoft.com/office/powerpoint/2010/main" xmlns="" val="3022281367"/>
       </p:ext>
     </p:extLst>
   </p:cSld>
@@ -1415,7 +1415,7 @@
     </p:spTree>
     <p:extLst>
       <p:ext uri="{BB962C8B-B14F-4D97-AF65-F5344CB8AC3E}">
-        <p14:creationId xmlns:p14="http://schemas.microsoft.com/office/powerpoint/2010/main" val="797876991"/>
+        <p14:creationId xmlns:p14="http://schemas.microsoft.com/office/powerpoint/2010/main" xmlns="" val="797876991"/>
       </p:ext>
     </p:extLst>
   </p:cSld>
@@ -1519,7 +1519,7 @@
     </p:spTree>
     <p:extLst>
       <p:ext uri="{BB962C8B-B14F-4D97-AF65-F5344CB8AC3E}">
-        <p14:creationId xmlns:p14="http://schemas.microsoft.com/office/powerpoint/2010/main" val="3140753640"/>
+        <p14:creationId xmlns:p14="http://schemas.microsoft.com/office/powerpoint/2010/main" xmlns="" val="3140753640"/>
       </p:ext>
     </p:extLst>
   </p:cSld>
@@ -1959,7 +1959,7 @@
   </p:clrMapOvr>
   <p:extLst mod="1">
     <p:ext uri="{DCECCB84-F9BA-43D5-87BE-67443E8EF086}">
-      <p15:sldGuideLst xmlns:p15="http://schemas.microsoft.com/office/powerpoint/2012/main">
+      <p15:sldGuideLst xmlns:p15="http://schemas.microsoft.com/office/powerpoint/2012/main" xmlns="">
         <p15:guide id="1" orient="horz" pos="2160" userDrawn="1">
           <p15:clr>
             <a:srgbClr val="FBAE40"/>
@@ -3576,7 +3576,7 @@
           </a:ln>
           <a:extLst>
             <a:ext uri="{91240B29-F687-4F45-9708-019B960494DF}">
-              <a14:hiddenLine xmlns:a14="http://schemas.microsoft.com/office/drawing/2010/main" w="9525">
+              <a14:hiddenLine xmlns:a14="http://schemas.microsoft.com/office/drawing/2010/main" xmlns="" w="9525">
                 <a:solidFill>
                   <a:srgbClr val="000000"/>
                 </a:solidFill>
@@ -3671,7 +3671,7 @@
           </a:ln>
           <a:extLst>
             <a:ext uri="{91240B29-F687-4F45-9708-019B960494DF}">
-              <a14:hiddenLine xmlns:a14="http://schemas.microsoft.com/office/drawing/2010/main" w="9525">
+              <a14:hiddenLine xmlns:a14="http://schemas.microsoft.com/office/drawing/2010/main" xmlns="" w="9525">
                 <a:solidFill>
                   <a:srgbClr val="000000"/>
                 </a:solidFill>
@@ -3766,7 +3766,7 @@
           </a:ln>
           <a:extLst>
             <a:ext uri="{91240B29-F687-4F45-9708-019B960494DF}">
-              <a14:hiddenLine xmlns:a14="http://schemas.microsoft.com/office/drawing/2010/main" w="9525">
+              <a14:hiddenLine xmlns:a14="http://schemas.microsoft.com/office/drawing/2010/main" xmlns="" w="9525">
                 <a:solidFill>
                   <a:srgbClr val="000000"/>
                 </a:solidFill>
@@ -4798,7 +4798,7 @@
     </p:spTree>
     <p:extLst>
       <p:ext uri="{BB962C8B-B14F-4D97-AF65-F5344CB8AC3E}">
-        <p14:creationId xmlns:p14="http://schemas.microsoft.com/office/powerpoint/2010/main" val="2895349213"/>
+        <p14:creationId xmlns:p14="http://schemas.microsoft.com/office/powerpoint/2010/main" xmlns="" val="2895349213"/>
       </p:ext>
     </p:extLst>
   </p:cSld>
@@ -5045,7 +5045,7 @@
     </p:spTree>
     <p:extLst>
       <p:ext uri="{BB962C8B-B14F-4D97-AF65-F5344CB8AC3E}">
-        <p14:creationId xmlns:p14="http://schemas.microsoft.com/office/powerpoint/2010/main" val="4216422739"/>
+        <p14:creationId xmlns:p14="http://schemas.microsoft.com/office/powerpoint/2010/main" xmlns="" val="4216422739"/>
       </p:ext>
     </p:extLst>
   </p:cSld>
@@ -5236,7 +5236,7 @@
     </p:spTree>
     <p:extLst>
       <p:ext uri="{BB962C8B-B14F-4D97-AF65-F5344CB8AC3E}">
-        <p14:creationId xmlns:p14="http://schemas.microsoft.com/office/powerpoint/2010/main" val="1466112408"/>
+        <p14:creationId xmlns:p14="http://schemas.microsoft.com/office/powerpoint/2010/main" xmlns="" val="1466112408"/>
       </p:ext>
     </p:extLst>
   </p:cSld>
@@ -5479,13 +5479,20 @@
     </p:spTree>
     <p:extLst>
       <p:ext uri="{BB962C8B-B14F-4D97-AF65-F5344CB8AC3E}">
-        <p14:creationId xmlns:p14="http://schemas.microsoft.com/office/powerpoint/2010/main" val="1836390994"/>
+        <p14:creationId xmlns:p14="http://schemas.microsoft.com/office/powerpoint/2010/main" xmlns="" val="1836390994"/>
       </p:ext>
     </p:extLst>
   </p:cSld>
   <p:clrMapOvr>
     <a:masterClrMapping/>
   </p:clrMapOvr>
+  <p:timing>
+    <p:tnLst>
+      <p:par>
+        <p:cTn id="1" dur="indefinite" restart="never" nodeType="tmRoot"/>
+      </p:par>
+    </p:tnLst>
+  </p:timing>
 </p:sld>
 </file>
 
@@ -5720,7 +5727,7 @@
           <a:blip r:embed="rId2">
             <a:extLst>
               <a:ext uri="{28A0092B-C50C-407E-A947-70E740481C1C}">
-                <a14:useLocalDpi xmlns:a14="http://schemas.microsoft.com/office/drawing/2010/main" val="0"/>
+                <a14:useLocalDpi xmlns:a14="http://schemas.microsoft.com/office/drawing/2010/main" xmlns="" val="0"/>
               </a:ext>
             </a:extLst>
           </a:blip>
@@ -5743,14 +5750,14 @@
           </a:ln>
           <a:extLst>
             <a:ext uri="{909E8E84-426E-40DD-AFC4-6F175D3DCCD1}">
-              <a14:hiddenFill xmlns:a14="http://schemas.microsoft.com/office/drawing/2010/main">
+              <a14:hiddenFill xmlns:a14="http://schemas.microsoft.com/office/drawing/2010/main" xmlns="">
                 <a:solidFill>
                   <a:schemeClr val="accent1"/>
                 </a:solidFill>
               </a14:hiddenFill>
             </a:ext>
             <a:ext uri="{91240B29-F687-4F45-9708-019B960494DF}">
-              <a14:hiddenLine xmlns:a14="http://schemas.microsoft.com/office/drawing/2010/main" w="9525">
+              <a14:hiddenLine xmlns:a14="http://schemas.microsoft.com/office/drawing/2010/main" xmlns="" w="9525">
                 <a:solidFill>
                   <a:schemeClr val="tx1"/>
                 </a:solidFill>
@@ -5891,7 +5898,7 @@
     </p:spTree>
     <p:extLst>
       <p:ext uri="{BB962C8B-B14F-4D97-AF65-F5344CB8AC3E}">
-        <p14:creationId xmlns:p14="http://schemas.microsoft.com/office/powerpoint/2010/main" val="4058165542"/>
+        <p14:creationId xmlns:p14="http://schemas.microsoft.com/office/powerpoint/2010/main" xmlns="" val="4058165542"/>
       </p:ext>
     </p:extLst>
   </p:cSld>
@@ -6256,13 +6263,20 @@
     </p:spTree>
     <p:extLst>
       <p:ext uri="{BB962C8B-B14F-4D97-AF65-F5344CB8AC3E}">
-        <p14:creationId xmlns:p14="http://schemas.microsoft.com/office/powerpoint/2010/main" val="2383928734"/>
+        <p14:creationId xmlns:p14="http://schemas.microsoft.com/office/powerpoint/2010/main" xmlns="" val="2383928734"/>
       </p:ext>
     </p:extLst>
   </p:cSld>
   <p:clrMapOvr>
     <a:masterClrMapping/>
   </p:clrMapOvr>
+  <p:timing>
+    <p:tnLst>
+      <p:par>
+        <p:cTn id="1" dur="indefinite" restart="never" nodeType="tmRoot"/>
+      </p:par>
+    </p:tnLst>
+  </p:timing>
 </p:sld>
 </file>
 
@@ -6427,7 +6441,7 @@
           <a:blip r:embed="rId2">
             <a:extLst>
               <a:ext uri="{28A0092B-C50C-407E-A947-70E740481C1C}">
-                <a14:useLocalDpi xmlns:a14="http://schemas.microsoft.com/office/drawing/2010/main" val="0"/>
+                <a14:useLocalDpi xmlns:a14="http://schemas.microsoft.com/office/drawing/2010/main" xmlns="" val="0"/>
               </a:ext>
             </a:extLst>
           </a:blip>
@@ -6450,14 +6464,14 @@
           </a:ln>
           <a:extLst>
             <a:ext uri="{909E8E84-426E-40DD-AFC4-6F175D3DCCD1}">
-              <a14:hiddenFill xmlns:a14="http://schemas.microsoft.com/office/drawing/2010/main">
+              <a14:hiddenFill xmlns:a14="http://schemas.microsoft.com/office/drawing/2010/main" xmlns="">
                 <a:solidFill>
                   <a:schemeClr val="accent1"/>
                 </a:solidFill>
               </a14:hiddenFill>
             </a:ext>
             <a:ext uri="{91240B29-F687-4F45-9708-019B960494DF}">
-              <a14:hiddenLine xmlns:a14="http://schemas.microsoft.com/office/drawing/2010/main" w="9525">
+              <a14:hiddenLine xmlns:a14="http://schemas.microsoft.com/office/drawing/2010/main" xmlns="" w="9525">
                 <a:solidFill>
                   <a:schemeClr val="tx1"/>
                 </a:solidFill>
@@ -6472,13 +6486,20 @@
     </p:spTree>
     <p:extLst>
       <p:ext uri="{BB962C8B-B14F-4D97-AF65-F5344CB8AC3E}">
-        <p14:creationId xmlns:p14="http://schemas.microsoft.com/office/powerpoint/2010/main" val="1075400916"/>
+        <p14:creationId xmlns:p14="http://schemas.microsoft.com/office/powerpoint/2010/main" xmlns="" val="1075400916"/>
       </p:ext>
     </p:extLst>
   </p:cSld>
   <p:clrMapOvr>
     <a:masterClrMapping/>
   </p:clrMapOvr>
+  <p:timing>
+    <p:tnLst>
+      <p:par>
+        <p:cTn id="1" dur="indefinite" restart="never" nodeType="tmRoot"/>
+      </p:par>
+    </p:tnLst>
+  </p:timing>
 </p:sld>
 </file>
 
@@ -6913,13 +6934,20 @@
     </p:spTree>
     <p:extLst>
       <p:ext uri="{BB962C8B-B14F-4D97-AF65-F5344CB8AC3E}">
-        <p14:creationId xmlns:p14="http://schemas.microsoft.com/office/powerpoint/2010/main" val="1550742323"/>
+        <p14:creationId xmlns:p14="http://schemas.microsoft.com/office/powerpoint/2010/main" xmlns="" val="1550742323"/>
       </p:ext>
     </p:extLst>
   </p:cSld>
   <p:clrMapOvr>
     <a:masterClrMapping/>
   </p:clrMapOvr>
+  <p:timing>
+    <p:tnLst>
+      <p:par>
+        <p:cTn id="1" dur="indefinite" restart="never" nodeType="tmRoot"/>
+      </p:par>
+    </p:tnLst>
+  </p:timing>
 </p:sld>
 </file>
 
@@ -7093,47 +7121,76 @@
           <a:lstStyle/>
           <a:p>
             <a:r>
-              <a:rPr lang="de-DE"/>
-              <a:t>Featurereichen und robusten Fahrstuhl programmiert</a:t>
-            </a:r>
-          </a:p>
-          <a:p>
-            <a:r>
-              <a:rPr lang="de-DE"/>
+              <a:rPr lang="de-DE" dirty="0" smtClean="0"/>
+              <a:t>Funktionsreichen </a:t>
+            </a:r>
+            <a:r>
+              <a:rPr lang="de-DE" dirty="0"/>
+              <a:t>und robusten Fahrstuhl programmiert</a:t>
+            </a:r>
+          </a:p>
+          <a:p>
+            <a:r>
+              <a:rPr lang="de-DE" dirty="0"/>
               <a:t>Arbeit im Team unter Verwendung von sowohl Aufgabenteilung als auch gemeinsamer Programmierung</a:t>
             </a:r>
           </a:p>
           <a:p>
             <a:r>
-              <a:rPr lang="de-DE"/>
-              <a:t>Eigenständige Lösungskonzeption und das Überwinden von Hürden in der programmiererischen Umsetzung</a:t>
-            </a:r>
-          </a:p>
-          <a:p>
-            <a:endParaRPr lang="de-DE"/>
-          </a:p>
-          <a:p>
-            <a:endParaRPr lang="de-DE"/>
-          </a:p>
-          <a:p>
-            <a:r>
-              <a:rPr lang="de-DE"/>
-              <a:t>Weitere Denkbare Features:</a:t>
+              <a:rPr lang="de-DE" dirty="0"/>
+              <a:t>Eigenständige Lösungskonzeption und das Überwinden von Hürden in der </a:t>
+            </a:r>
+            <a:r>
+              <a:rPr lang="de-DE" dirty="0" err="1"/>
+              <a:t>programmiererischen</a:t>
+            </a:r>
+            <a:r>
+              <a:rPr lang="de-DE" dirty="0"/>
+              <a:t> Umsetzung</a:t>
+            </a:r>
+          </a:p>
+          <a:p>
+            <a:endParaRPr lang="de-DE" dirty="0"/>
+          </a:p>
+          <a:p>
+            <a:endParaRPr lang="de-DE" dirty="0"/>
+          </a:p>
+          <a:p>
+            <a:r>
+              <a:rPr lang="de-DE" dirty="0"/>
+              <a:t>Weitere </a:t>
+            </a:r>
+            <a:r>
+              <a:rPr lang="de-DE" dirty="0" smtClean="0"/>
+              <a:t>denkbare </a:t>
+            </a:r>
+            <a:r>
+              <a:rPr lang="de-DE" dirty="0"/>
+              <a:t>Features:</a:t>
             </a:r>
           </a:p>
           <a:p>
             <a:pPr lvl="1"/>
             <a:r>
-              <a:rPr lang="de-DE"/>
-              <a:t>Unterschiedlich Geschwindigkeitseinstellungen</a:t>
+              <a:rPr lang="de-DE" dirty="0" smtClean="0"/>
+              <a:t>Unterschiedliche </a:t>
+            </a:r>
+            <a:r>
+              <a:rPr lang="de-DE" dirty="0"/>
+              <a:t>Geschwindigkeitseinstellungen</a:t>
             </a:r>
           </a:p>
           <a:p>
             <a:pPr lvl="1"/>
             <a:r>
-              <a:rPr lang="de-DE"/>
-              <a:t>Andere Warteschlangenlogik/-prioritäten</a:t>
-            </a:r>
+              <a:rPr lang="de-DE" dirty="0"/>
+              <a:t>Andere Warteschlangenlogik/-</a:t>
+            </a:r>
+            <a:r>
+              <a:rPr lang="de-DE" dirty="0" err="1"/>
+              <a:t>prioritäten</a:t>
+            </a:r>
+            <a:endParaRPr lang="de-DE" dirty="0"/>
           </a:p>
           <a:p>
             <a:endParaRPr lang="de-DE" dirty="0"/>
@@ -7143,13 +7200,20 @@
     </p:spTree>
     <p:extLst>
       <p:ext uri="{BB962C8B-B14F-4D97-AF65-F5344CB8AC3E}">
-        <p14:creationId xmlns:p14="http://schemas.microsoft.com/office/powerpoint/2010/main" val="2284810438"/>
+        <p14:creationId xmlns:p14="http://schemas.microsoft.com/office/powerpoint/2010/main" xmlns="" val="2284810438"/>
       </p:ext>
     </p:extLst>
   </p:cSld>
   <p:clrMapOvr>
     <a:masterClrMapping/>
   </p:clrMapOvr>
+  <p:timing>
+    <p:tnLst>
+      <p:par>
+        <p:cTn id="1" dur="indefinite" restart="never" nodeType="tmRoot"/>
+      </p:par>
+    </p:tnLst>
+  </p:timing>
 </p:sld>
 </file>
 
@@ -7428,7 +7492,7 @@
     </p:spTree>
     <p:extLst>
       <p:ext uri="{BB962C8B-B14F-4D97-AF65-F5344CB8AC3E}">
-        <p14:creationId xmlns:p14="http://schemas.microsoft.com/office/powerpoint/2010/main" val="1684480284"/>
+        <p14:creationId xmlns:p14="http://schemas.microsoft.com/office/powerpoint/2010/main" xmlns="" val="1684480284"/>
       </p:ext>
     </p:extLst>
   </p:cSld>
@@ -7436,6 +7500,13 @@
     <a:masterClrMapping/>
   </p:clrMapOvr>
   <p:transition/>
+  <p:timing>
+    <p:tnLst>
+      <p:par>
+        <p:cTn id="1" dur="indefinite" restart="never" nodeType="tmRoot"/>
+      </p:par>
+    </p:tnLst>
+  </p:timing>
 </p:sld>
 </file>
 
@@ -7875,7 +7946,7 @@
     </p:spTree>
     <p:extLst>
       <p:ext uri="{BB962C8B-B14F-4D97-AF65-F5344CB8AC3E}">
-        <p14:creationId xmlns:p14="http://schemas.microsoft.com/office/powerpoint/2010/main" val="309100733"/>
+        <p14:creationId xmlns:p14="http://schemas.microsoft.com/office/powerpoint/2010/main" xmlns="" val="309100733"/>
       </p:ext>
     </p:extLst>
   </p:cSld>
@@ -8220,7 +8291,7 @@
     </p:spTree>
     <p:extLst>
       <p:ext uri="{BB962C8B-B14F-4D97-AF65-F5344CB8AC3E}">
-        <p14:creationId xmlns:p14="http://schemas.microsoft.com/office/powerpoint/2010/main" val="4221714953"/>
+        <p14:creationId xmlns:p14="http://schemas.microsoft.com/office/powerpoint/2010/main" xmlns="" val="4221714953"/>
       </p:ext>
     </p:extLst>
   </p:cSld>
@@ -8388,7 +8459,7 @@
     </p:spTree>
     <p:extLst>
       <p:ext uri="{BB962C8B-B14F-4D97-AF65-F5344CB8AC3E}">
-        <p14:creationId xmlns:p14="http://schemas.microsoft.com/office/powerpoint/2010/main" val="1893387264"/>
+        <p14:creationId xmlns:p14="http://schemas.microsoft.com/office/powerpoint/2010/main" xmlns="" val="1893387264"/>
       </p:ext>
     </p:extLst>
   </p:cSld>
@@ -8826,7 +8897,7 @@
     </p:spTree>
     <p:extLst>
       <p:ext uri="{BB962C8B-B14F-4D97-AF65-F5344CB8AC3E}">
-        <p14:creationId xmlns:p14="http://schemas.microsoft.com/office/powerpoint/2010/main" val="3395949267"/>
+        <p14:creationId xmlns:p14="http://schemas.microsoft.com/office/powerpoint/2010/main" xmlns="" val="3395949267"/>
       </p:ext>
     </p:extLst>
   </p:cSld>
@@ -9020,7 +9091,7 @@
     </p:spTree>
     <p:extLst>
       <p:ext uri="{BB962C8B-B14F-4D97-AF65-F5344CB8AC3E}">
-        <p14:creationId xmlns:p14="http://schemas.microsoft.com/office/powerpoint/2010/main" val="3427100782"/>
+        <p14:creationId xmlns:p14="http://schemas.microsoft.com/office/powerpoint/2010/main" xmlns="" val="3427100782"/>
       </p:ext>
     </p:extLst>
   </p:cSld>
@@ -9214,7 +9285,7 @@
     </p:spTree>
     <p:extLst>
       <p:ext uri="{BB962C8B-B14F-4D97-AF65-F5344CB8AC3E}">
-        <p14:creationId xmlns:p14="http://schemas.microsoft.com/office/powerpoint/2010/main" val="1036794897"/>
+        <p14:creationId xmlns:p14="http://schemas.microsoft.com/office/powerpoint/2010/main" xmlns="" val="1036794897"/>
       </p:ext>
     </p:extLst>
   </p:cSld>
@@ -9457,7 +9528,7 @@
     </p:spTree>
     <p:extLst>
       <p:ext uri="{BB962C8B-B14F-4D97-AF65-F5344CB8AC3E}">
-        <p14:creationId xmlns:p14="http://schemas.microsoft.com/office/powerpoint/2010/main" val="1366462204"/>
+        <p14:creationId xmlns:p14="http://schemas.microsoft.com/office/powerpoint/2010/main" xmlns="" val="1366462204"/>
       </p:ext>
     </p:extLst>
   </p:cSld>
@@ -9670,7 +9741,7 @@
     </p:spTree>
     <p:extLst>
       <p:ext uri="{BB962C8B-B14F-4D97-AF65-F5344CB8AC3E}">
-        <p14:creationId xmlns:p14="http://schemas.microsoft.com/office/powerpoint/2010/main" val="456857022"/>
+        <p14:creationId xmlns:p14="http://schemas.microsoft.com/office/powerpoint/2010/main" xmlns="" val="456857022"/>
       </p:ext>
     </p:extLst>
   </p:cSld>

</xml_diff>